<commit_message>
effect table 하는 중
</commit_message>
<xml_diff>
--- a/로스트아크/데이터테이블/고민해야하는것.pptx
+++ b/로스트아크/데이터테이블/고민해야하는것.pptx
@@ -8,6 +8,7 @@
     <p:sldId id="256" r:id="rId2"/>
     <p:sldId id="258" r:id="rId3"/>
     <p:sldId id="259" r:id="rId4"/>
+    <p:sldId id="260" r:id="rId5"/>
   </p:sldIdLst>
   <p:sldSz cx="12192000" cy="6858000"/>
   <p:notesSz cx="6858000" cy="9144000"/>
@@ -272,7 +273,7 @@
           <a:p>
             <a:fld id="{380BDB39-6A3E-454B-9FEF-5F81BCC4A20C}" type="datetimeFigureOut">
               <a:rPr lang="ko-KR" altLang="en-US" smtClean="0"/>
-              <a:t>2025-05-08</a:t>
+              <a:t>2025-08-04</a:t>
             </a:fld>
             <a:endParaRPr lang="ko-KR" altLang="en-US"/>
           </a:p>
@@ -470,7 +471,7 @@
           <a:p>
             <a:fld id="{380BDB39-6A3E-454B-9FEF-5F81BCC4A20C}" type="datetimeFigureOut">
               <a:rPr lang="ko-KR" altLang="en-US" smtClean="0"/>
-              <a:t>2025-05-08</a:t>
+              <a:t>2025-08-04</a:t>
             </a:fld>
             <a:endParaRPr lang="ko-KR" altLang="en-US"/>
           </a:p>
@@ -678,7 +679,7 @@
           <a:p>
             <a:fld id="{380BDB39-6A3E-454B-9FEF-5F81BCC4A20C}" type="datetimeFigureOut">
               <a:rPr lang="ko-KR" altLang="en-US" smtClean="0"/>
-              <a:t>2025-05-08</a:t>
+              <a:t>2025-08-04</a:t>
             </a:fld>
             <a:endParaRPr lang="ko-KR" altLang="en-US"/>
           </a:p>
@@ -876,7 +877,7 @@
           <a:p>
             <a:fld id="{380BDB39-6A3E-454B-9FEF-5F81BCC4A20C}" type="datetimeFigureOut">
               <a:rPr lang="ko-KR" altLang="en-US" smtClean="0"/>
-              <a:t>2025-05-08</a:t>
+              <a:t>2025-08-04</a:t>
             </a:fld>
             <a:endParaRPr lang="ko-KR" altLang="en-US"/>
           </a:p>
@@ -1151,7 +1152,7 @@
           <a:p>
             <a:fld id="{380BDB39-6A3E-454B-9FEF-5F81BCC4A20C}" type="datetimeFigureOut">
               <a:rPr lang="ko-KR" altLang="en-US" smtClean="0"/>
-              <a:t>2025-05-08</a:t>
+              <a:t>2025-08-04</a:t>
             </a:fld>
             <a:endParaRPr lang="ko-KR" altLang="en-US"/>
           </a:p>
@@ -1416,7 +1417,7 @@
           <a:p>
             <a:fld id="{380BDB39-6A3E-454B-9FEF-5F81BCC4A20C}" type="datetimeFigureOut">
               <a:rPr lang="ko-KR" altLang="en-US" smtClean="0"/>
-              <a:t>2025-05-08</a:t>
+              <a:t>2025-08-04</a:t>
             </a:fld>
             <a:endParaRPr lang="ko-KR" altLang="en-US"/>
           </a:p>
@@ -1828,7 +1829,7 @@
           <a:p>
             <a:fld id="{380BDB39-6A3E-454B-9FEF-5F81BCC4A20C}" type="datetimeFigureOut">
               <a:rPr lang="ko-KR" altLang="en-US" smtClean="0"/>
-              <a:t>2025-05-08</a:t>
+              <a:t>2025-08-04</a:t>
             </a:fld>
             <a:endParaRPr lang="ko-KR" altLang="en-US"/>
           </a:p>
@@ -1969,7 +1970,7 @@
           <a:p>
             <a:fld id="{380BDB39-6A3E-454B-9FEF-5F81BCC4A20C}" type="datetimeFigureOut">
               <a:rPr lang="ko-KR" altLang="en-US" smtClean="0"/>
-              <a:t>2025-05-08</a:t>
+              <a:t>2025-08-04</a:t>
             </a:fld>
             <a:endParaRPr lang="ko-KR" altLang="en-US"/>
           </a:p>
@@ -2082,7 +2083,7 @@
           <a:p>
             <a:fld id="{380BDB39-6A3E-454B-9FEF-5F81BCC4A20C}" type="datetimeFigureOut">
               <a:rPr lang="ko-KR" altLang="en-US" smtClean="0"/>
-              <a:t>2025-05-08</a:t>
+              <a:t>2025-08-04</a:t>
             </a:fld>
             <a:endParaRPr lang="ko-KR" altLang="en-US"/>
           </a:p>
@@ -2393,7 +2394,7 @@
           <a:p>
             <a:fld id="{380BDB39-6A3E-454B-9FEF-5F81BCC4A20C}" type="datetimeFigureOut">
               <a:rPr lang="ko-KR" altLang="en-US" smtClean="0"/>
-              <a:t>2025-05-08</a:t>
+              <a:t>2025-08-04</a:t>
             </a:fld>
             <a:endParaRPr lang="ko-KR" altLang="en-US"/>
           </a:p>
@@ -2681,7 +2682,7 @@
           <a:p>
             <a:fld id="{380BDB39-6A3E-454B-9FEF-5F81BCC4A20C}" type="datetimeFigureOut">
               <a:rPr lang="ko-KR" altLang="en-US" smtClean="0"/>
-              <a:t>2025-05-08</a:t>
+              <a:t>2025-08-04</a:t>
             </a:fld>
             <a:endParaRPr lang="ko-KR" altLang="en-US"/>
           </a:p>
@@ -2922,7 +2923,7 @@
           <a:p>
             <a:fld id="{380BDB39-6A3E-454B-9FEF-5F81BCC4A20C}" type="datetimeFigureOut">
               <a:rPr lang="ko-KR" altLang="en-US" smtClean="0"/>
-              <a:t>2025-05-08</a:t>
+              <a:t>2025-08-04</a:t>
             </a:fld>
             <a:endParaRPr lang="ko-KR" altLang="en-US"/>
           </a:p>
@@ -4612,6 +4613,695 @@
     <p:extLst>
       <p:ext uri="{BB962C8B-B14F-4D97-AF65-F5344CB8AC3E}">
         <p14:creationId xmlns:p14="http://schemas.microsoft.com/office/powerpoint/2010/main" val="3709301207"/>
+      </p:ext>
+    </p:extLst>
+  </p:cSld>
+  <p:clrMapOvr>
+    <a:masterClrMapping/>
+  </p:clrMapOvr>
+</p:sld>
+</file>
+
+<file path=ppt/slides/slide4.xml><?xml version="1.0" encoding="utf-8"?>
+<p:sld xmlns:a="http://schemas.openxmlformats.org/drawingml/2006/main" xmlns:r="http://schemas.openxmlformats.org/officeDocument/2006/relationships" xmlns:p="http://schemas.openxmlformats.org/presentationml/2006/main">
+  <p:cSld>
+    <p:spTree>
+      <p:nvGrpSpPr>
+        <p:cNvPr id="1" name=""/>
+        <p:cNvGrpSpPr/>
+        <p:nvPr/>
+      </p:nvGrpSpPr>
+      <p:grpSpPr>
+        <a:xfrm>
+          <a:off x="0" y="0"/>
+          <a:ext cx="0" cy="0"/>
+          <a:chOff x="0" y="0"/>
+          <a:chExt cx="0" cy="0"/>
+        </a:xfrm>
+      </p:grpSpPr>
+      <p:sp>
+        <p:nvSpPr>
+          <p:cNvPr id="4" name="TextBox 3">
+            <a:extLst>
+              <a:ext uri="{FF2B5EF4-FFF2-40B4-BE49-F238E27FC236}">
+                <a16:creationId xmlns:a16="http://schemas.microsoft.com/office/drawing/2014/main" id="{2B188A69-88F4-B921-E9CD-02103C9FED2D}"/>
+              </a:ext>
+            </a:extLst>
+          </p:cNvPr>
+          <p:cNvSpPr txBox="1"/>
+          <p:nvPr/>
+        </p:nvSpPr>
+        <p:spPr>
+          <a:xfrm>
+            <a:off x="99835" y="161365"/>
+            <a:ext cx="11263020" cy="600164"/>
+          </a:xfrm>
+          <a:prstGeom prst="rect">
+            <a:avLst/>
+          </a:prstGeom>
+          <a:noFill/>
+        </p:spPr>
+        <p:txBody>
+          <a:bodyPr wrap="none" rtlCol="0">
+            <a:spAutoFit/>
+          </a:bodyPr>
+          <a:lstStyle/>
+          <a:p>
+            <a:r>
+              <a:rPr lang="ko-KR" altLang="en-US" sz="1100" dirty="0"/>
+              <a:t>키 입력</a:t>
+            </a:r>
+            <a:r>
+              <a:rPr lang="en-US" altLang="ko-KR" sz="1100" dirty="0"/>
+              <a:t> -&gt; </a:t>
+            </a:r>
+            <a:r>
+              <a:rPr lang="ko-KR" altLang="en-US" sz="1100" dirty="0"/>
+              <a:t>해당 키에 등록된 스킬의 </a:t>
+            </a:r>
+            <a:r>
+              <a:rPr lang="en-US" altLang="ko-KR" sz="1100" dirty="0" err="1"/>
+              <a:t>skill_info_key</a:t>
+            </a:r>
+            <a:r>
+              <a:rPr lang="ko-KR" altLang="en-US" sz="1100" dirty="0"/>
+              <a:t>를 서버로 전송 </a:t>
+            </a:r>
+            <a:r>
+              <a:rPr lang="en-US" altLang="ko-KR" sz="1100" dirty="0"/>
+              <a:t>-&gt; </a:t>
+            </a:r>
+            <a:r>
+              <a:rPr lang="ko-KR" altLang="en-US" sz="1100" dirty="0"/>
+              <a:t>서버에서 유저가 선택한 해당 스킬의 트라이포드 목록을 확인</a:t>
+            </a:r>
+            <a:endParaRPr lang="en-US" altLang="ko-KR" sz="1100" dirty="0"/>
+          </a:p>
+          <a:p>
+            <a:r>
+              <a:rPr lang="en-US" altLang="ko-KR" sz="1100" dirty="0"/>
+              <a:t>-&gt; </a:t>
+            </a:r>
+            <a:r>
+              <a:rPr lang="en-US" altLang="ko-KR" sz="1100" dirty="0" err="1"/>
+              <a:t>skill_info_key</a:t>
+            </a:r>
+            <a:r>
+              <a:rPr lang="en-US" altLang="ko-KR" sz="1100" dirty="0"/>
+              <a:t>, tripod </a:t>
+            </a:r>
+            <a:r>
+              <a:rPr lang="ko-KR" altLang="en-US" sz="1100" dirty="0"/>
+              <a:t>선택에 맞는 스킬 </a:t>
+            </a:r>
+            <a:r>
+              <a:rPr lang="en-US" altLang="ko-KR" sz="1100" dirty="0"/>
+              <a:t>id </a:t>
+            </a:r>
+            <a:r>
+              <a:rPr lang="ko-KR" altLang="en-US" sz="1100" dirty="0"/>
+              <a:t>검색 </a:t>
+            </a:r>
+            <a:r>
+              <a:rPr lang="en-US" altLang="ko-KR" sz="1100" dirty="0"/>
+              <a:t>-&gt; </a:t>
+            </a:r>
+            <a:r>
+              <a:rPr lang="ko-KR" altLang="en-US" sz="1100" dirty="0"/>
+              <a:t>스킬 </a:t>
+            </a:r>
+            <a:r>
+              <a:rPr lang="en-US" altLang="ko-KR" sz="1100" dirty="0"/>
+              <a:t>id</a:t>
+            </a:r>
+            <a:r>
+              <a:rPr lang="ko-KR" altLang="en-US" sz="1100" dirty="0"/>
+              <a:t>를 토대로 해당 스킬의 효과들 검색 </a:t>
+            </a:r>
+            <a:r>
+              <a:rPr lang="en-US" altLang="ko-KR" sz="1100" dirty="0"/>
+              <a:t>-&gt; </a:t>
+            </a:r>
+            <a:r>
+              <a:rPr lang="ko-KR" altLang="en-US" sz="1100" dirty="0"/>
+              <a:t>효과들의 수치 확인 </a:t>
+            </a:r>
+            <a:r>
+              <a:rPr lang="en-US" altLang="ko-KR" sz="1100" dirty="0"/>
+              <a:t>-&gt; </a:t>
+            </a:r>
+            <a:r>
+              <a:rPr lang="ko-KR" altLang="en-US" sz="1100" dirty="0"/>
+              <a:t>효과 </a:t>
+            </a:r>
+            <a:r>
+              <a:rPr lang="en-US" altLang="ko-KR" sz="1100" dirty="0"/>
+              <a:t>id,</a:t>
+            </a:r>
+            <a:r>
+              <a:rPr lang="ko-KR" altLang="en-US" sz="1100" dirty="0"/>
+              <a:t> 수치로 효과 발동 함수 호출 </a:t>
+            </a:r>
+            <a:r>
+              <a:rPr lang="en-US" altLang="ko-KR" sz="1100" dirty="0"/>
+              <a:t>-&gt; </a:t>
+            </a:r>
+            <a:r>
+              <a:rPr lang="ko-KR" altLang="en-US" sz="1100" dirty="0"/>
+              <a:t>효과 발동</a:t>
+            </a:r>
+          </a:p>
+          <a:p>
+            <a:endParaRPr lang="ko-KR" altLang="en-US" sz="1100" dirty="0"/>
+          </a:p>
+        </p:txBody>
+      </p:sp>
+      <p:sp>
+        <p:nvSpPr>
+          <p:cNvPr id="6" name="TextBox 5">
+            <a:extLst>
+              <a:ext uri="{FF2B5EF4-FFF2-40B4-BE49-F238E27FC236}">
+                <a16:creationId xmlns:a16="http://schemas.microsoft.com/office/drawing/2014/main" id="{89C8592E-B620-1121-1A76-D81B505EC1D2}"/>
+              </a:ext>
+            </a:extLst>
+          </p:cNvPr>
+          <p:cNvSpPr txBox="1"/>
+          <p:nvPr/>
+        </p:nvSpPr>
+        <p:spPr>
+          <a:xfrm>
+            <a:off x="99835" y="1927820"/>
+            <a:ext cx="3437159" cy="1277273"/>
+          </a:xfrm>
+          <a:prstGeom prst="rect">
+            <a:avLst/>
+          </a:prstGeom>
+          <a:noFill/>
+        </p:spPr>
+        <p:txBody>
+          <a:bodyPr wrap="none" rtlCol="0">
+            <a:spAutoFit/>
+          </a:bodyPr>
+          <a:lstStyle/>
+          <a:p>
+            <a:r>
+              <a:rPr lang="en-US" altLang="ko-KR" sz="1100" dirty="0"/>
+              <a:t>effect</a:t>
+            </a:r>
+            <a:r>
+              <a:rPr lang="ko-KR" altLang="en-US" sz="1100" dirty="0"/>
+              <a:t> </a:t>
+            </a:r>
+            <a:r>
+              <a:rPr lang="en-US" altLang="ko-KR" sz="1100" dirty="0"/>
+              <a:t>table</a:t>
+            </a:r>
+            <a:r>
+              <a:rPr lang="ko-KR" altLang="en-US" sz="1100" dirty="0"/>
+              <a:t>에는 어떤 데이터가 들어가야 할까</a:t>
+            </a:r>
+            <a:r>
+              <a:rPr lang="en-US" altLang="ko-KR" sz="1100" dirty="0"/>
+              <a:t>?</a:t>
+            </a:r>
+          </a:p>
+          <a:p>
+            <a:pPr marL="171450" indent="-171450">
+              <a:buFontTx/>
+              <a:buChar char="-"/>
+            </a:pPr>
+            <a:r>
+              <a:rPr lang="en-US" altLang="ko-KR" sz="1100" dirty="0"/>
+              <a:t>effect table</a:t>
+            </a:r>
+            <a:r>
+              <a:rPr lang="ko-KR" altLang="en-US" sz="1100" dirty="0"/>
+              <a:t>의 역할 </a:t>
+            </a:r>
+            <a:r>
+              <a:rPr lang="en-US" altLang="ko-KR" sz="1100" dirty="0"/>
+              <a:t>:</a:t>
+            </a:r>
+            <a:r>
+              <a:rPr lang="ko-KR" altLang="en-US" sz="1100" dirty="0"/>
+              <a:t> </a:t>
+            </a:r>
+            <a:r>
+              <a:rPr lang="en-US" altLang="ko-KR" sz="1100" dirty="0"/>
+              <a:t>‘</a:t>
+            </a:r>
+            <a:r>
+              <a:rPr lang="ko-KR" altLang="en-US" sz="1100" dirty="0"/>
+              <a:t>효과 정의</a:t>
+            </a:r>
+            <a:r>
+              <a:rPr lang="en-US" altLang="ko-KR" sz="1100" dirty="0"/>
+              <a:t>’</a:t>
+            </a:r>
+          </a:p>
+          <a:p>
+            <a:pPr marL="171450" indent="-171450">
+              <a:buFontTx/>
+              <a:buChar char="-"/>
+            </a:pPr>
+            <a:r>
+              <a:rPr lang="ko-KR" altLang="en-US" sz="1100" dirty="0"/>
+              <a:t>효과 </a:t>
+            </a:r>
+            <a:r>
+              <a:rPr lang="en-US" altLang="ko-KR" sz="1100" dirty="0"/>
+              <a:t>id</a:t>
+            </a:r>
+          </a:p>
+          <a:p>
+            <a:pPr marL="171450" indent="-171450">
+              <a:buFontTx/>
+              <a:buChar char="-"/>
+            </a:pPr>
+            <a:r>
+              <a:rPr lang="ko-KR" altLang="en-US" sz="1100" dirty="0"/>
+              <a:t>효과 이름</a:t>
+            </a:r>
+            <a:r>
+              <a:rPr lang="en-US" altLang="ko-KR" sz="1100" dirty="0"/>
+              <a:t>(</a:t>
+            </a:r>
+            <a:r>
+              <a:rPr lang="ko-KR" altLang="en-US" sz="1100" dirty="0"/>
+              <a:t>이름이 테이블로 들어갈 필요가 있나</a:t>
+            </a:r>
+            <a:r>
+              <a:rPr lang="en-US" altLang="ko-KR" sz="1100" dirty="0"/>
+              <a:t>?)</a:t>
+            </a:r>
+          </a:p>
+          <a:p>
+            <a:pPr marL="171450" indent="-171450">
+              <a:buFontTx/>
+              <a:buChar char="-"/>
+            </a:pPr>
+            <a:r>
+              <a:rPr lang="ko-KR" altLang="en-US" sz="1100" dirty="0"/>
+              <a:t>효과 유형</a:t>
+            </a:r>
+            <a:r>
+              <a:rPr lang="en-US" altLang="ko-KR" sz="1100" dirty="0"/>
+              <a:t>(</a:t>
+            </a:r>
+            <a:r>
+              <a:rPr lang="ko-KR" altLang="en-US" sz="1100" dirty="0"/>
+              <a:t>대분류</a:t>
+            </a:r>
+            <a:r>
+              <a:rPr lang="en-US" altLang="ko-KR" sz="1100" dirty="0"/>
+              <a:t>)</a:t>
+            </a:r>
+          </a:p>
+          <a:p>
+            <a:pPr marL="171450" indent="-171450">
+              <a:buFontTx/>
+              <a:buChar char="-"/>
+            </a:pPr>
+            <a:r>
+              <a:rPr lang="ko-KR" altLang="en-US" sz="1100" dirty="0"/>
+              <a:t>효과 세부 유형</a:t>
+            </a:r>
+            <a:r>
+              <a:rPr lang="en-US" altLang="ko-KR" sz="1100" dirty="0"/>
+              <a:t>(</a:t>
+            </a:r>
+            <a:r>
+              <a:rPr lang="ko-KR" altLang="en-US" sz="1100" dirty="0"/>
+              <a:t>소분류</a:t>
+            </a:r>
+            <a:r>
+              <a:rPr lang="en-US" altLang="ko-KR" sz="1100" dirty="0"/>
+              <a:t>)</a:t>
+            </a:r>
+          </a:p>
+          <a:p>
+            <a:pPr marL="171450" indent="-171450">
+              <a:buFontTx/>
+              <a:buChar char="-"/>
+            </a:pPr>
+            <a:r>
+              <a:rPr lang="ko-KR" altLang="en-US" sz="1100" dirty="0"/>
+              <a:t>효과 매개 변수</a:t>
+            </a:r>
+            <a:endParaRPr lang="en-US" altLang="ko-KR" sz="1100" dirty="0"/>
+          </a:p>
+        </p:txBody>
+      </p:sp>
+      <p:sp>
+        <p:nvSpPr>
+          <p:cNvPr id="7" name="TextBox 6">
+            <a:extLst>
+              <a:ext uri="{FF2B5EF4-FFF2-40B4-BE49-F238E27FC236}">
+                <a16:creationId xmlns:a16="http://schemas.microsoft.com/office/drawing/2014/main" id="{214C5992-92B7-AE90-6DD0-4A2CDCC6EAD4}"/>
+              </a:ext>
+            </a:extLst>
+          </p:cNvPr>
+          <p:cNvSpPr txBox="1"/>
+          <p:nvPr/>
+        </p:nvSpPr>
+        <p:spPr>
+          <a:xfrm>
+            <a:off x="245307" y="4466194"/>
+            <a:ext cx="2188420" cy="1954381"/>
+          </a:xfrm>
+          <a:prstGeom prst="rect">
+            <a:avLst/>
+          </a:prstGeom>
+          <a:noFill/>
+        </p:spPr>
+        <p:txBody>
+          <a:bodyPr wrap="none" rtlCol="0">
+            <a:spAutoFit/>
+          </a:bodyPr>
+          <a:lstStyle/>
+          <a:p>
+            <a:r>
+              <a:rPr lang="en-US" altLang="ko-KR" sz="1100" dirty="0"/>
+              <a:t>// </a:t>
+            </a:r>
+            <a:r>
+              <a:rPr lang="ko-KR" altLang="en-US" sz="1100" dirty="0"/>
+              <a:t>공포 </a:t>
+            </a:r>
+            <a:r>
+              <a:rPr lang="ko-KR" altLang="en-US" sz="1100" dirty="0" err="1"/>
+              <a:t>디버프를</a:t>
+            </a:r>
+            <a:r>
+              <a:rPr lang="ko-KR" altLang="en-US" sz="1100" dirty="0"/>
+              <a:t> 부여하는 함수</a:t>
+            </a:r>
+            <a:endParaRPr lang="en-US" altLang="ko-KR" sz="1100" dirty="0"/>
+          </a:p>
+          <a:p>
+            <a:r>
+              <a:rPr lang="en-US" altLang="ko-KR" sz="1100" dirty="0"/>
+              <a:t>Fear(</a:t>
+            </a:r>
+            <a:r>
+              <a:rPr lang="en-US" altLang="ko-KR" sz="1100" dirty="0" err="1"/>
+              <a:t>target_id</a:t>
+            </a:r>
+            <a:r>
+              <a:rPr lang="en-US" altLang="ko-KR" sz="1100" dirty="0"/>
+              <a:t>, duration)</a:t>
+            </a:r>
+          </a:p>
+          <a:p>
+            <a:r>
+              <a:rPr lang="en-US" altLang="ko-KR" sz="1100" dirty="0"/>
+              <a:t>{</a:t>
+            </a:r>
+          </a:p>
+          <a:p>
+            <a:r>
+              <a:rPr lang="en-US" altLang="ko-KR" sz="1100" dirty="0"/>
+              <a:t>   timer = 0.0f;</a:t>
+            </a:r>
+          </a:p>
+          <a:p>
+            <a:r>
+              <a:rPr lang="en-US" altLang="ko-KR" sz="1100" dirty="0"/>
+              <a:t>   </a:t>
+            </a:r>
+            <a:r>
+              <a:rPr lang="en-US" altLang="ko-KR" sz="1100" dirty="0" err="1"/>
+              <a:t>target_id.state</a:t>
+            </a:r>
+            <a:r>
+              <a:rPr lang="en-US" altLang="ko-KR" sz="1100" dirty="0"/>
+              <a:t> = fear;</a:t>
+            </a:r>
+          </a:p>
+          <a:p>
+            <a:r>
+              <a:rPr lang="en-US" altLang="ko-KR" sz="1100" dirty="0"/>
+              <a:t>   if (timer &gt;= duration)</a:t>
+            </a:r>
+          </a:p>
+          <a:p>
+            <a:r>
+              <a:rPr lang="en-US" altLang="ko-KR" sz="1100" dirty="0"/>
+              <a:t>       </a:t>
+            </a:r>
+            <a:r>
+              <a:rPr lang="en-US" altLang="ko-KR" sz="1100" dirty="0" err="1"/>
+              <a:t>target_id.state</a:t>
+            </a:r>
+            <a:r>
+              <a:rPr lang="en-US" altLang="ko-KR" sz="1100" dirty="0"/>
+              <a:t> = normal;</a:t>
+            </a:r>
+          </a:p>
+          <a:p>
+            <a:r>
+              <a:rPr lang="en-US" altLang="ko-KR" sz="1100" dirty="0"/>
+              <a:t>       timer = 0.0f;</a:t>
+            </a:r>
+          </a:p>
+          <a:p>
+            <a:r>
+              <a:rPr lang="en-US" altLang="ko-KR" sz="1100" dirty="0"/>
+              <a:t>   else </a:t>
+            </a:r>
+          </a:p>
+          <a:p>
+            <a:r>
+              <a:rPr lang="en-US" altLang="ko-KR" sz="1100" dirty="0"/>
+              <a:t>       timer += </a:t>
+            </a:r>
+            <a:r>
+              <a:rPr lang="en-US" altLang="ko-KR" sz="1100" dirty="0" err="1"/>
+              <a:t>unit_time</a:t>
+            </a:r>
+            <a:r>
+              <a:rPr lang="en-US" altLang="ko-KR" sz="1100" dirty="0"/>
+              <a:t>;</a:t>
+            </a:r>
+          </a:p>
+          <a:p>
+            <a:r>
+              <a:rPr lang="en-US" altLang="ko-KR" sz="1100" dirty="0"/>
+              <a:t>}</a:t>
+            </a:r>
+            <a:endParaRPr lang="ko-KR" altLang="en-US" sz="1100" dirty="0"/>
+          </a:p>
+        </p:txBody>
+      </p:sp>
+      <p:sp>
+        <p:nvSpPr>
+          <p:cNvPr id="8" name="TextBox 7">
+            <a:extLst>
+              <a:ext uri="{FF2B5EF4-FFF2-40B4-BE49-F238E27FC236}">
+                <a16:creationId xmlns:a16="http://schemas.microsoft.com/office/drawing/2014/main" id="{4D77FFEA-8F44-7A7F-47F4-7EE829DF555E}"/>
+              </a:ext>
+            </a:extLst>
+          </p:cNvPr>
+          <p:cNvSpPr txBox="1"/>
+          <p:nvPr/>
+        </p:nvSpPr>
+        <p:spPr>
+          <a:xfrm>
+            <a:off x="3778216" y="4466194"/>
+            <a:ext cx="6202339" cy="1615827"/>
+          </a:xfrm>
+          <a:prstGeom prst="rect">
+            <a:avLst/>
+          </a:prstGeom>
+          <a:noFill/>
+        </p:spPr>
+        <p:txBody>
+          <a:bodyPr wrap="none" rtlCol="0">
+            <a:spAutoFit/>
+          </a:bodyPr>
+          <a:lstStyle/>
+          <a:p>
+            <a:r>
+              <a:rPr lang="en-US" altLang="ko-KR" sz="1100" dirty="0"/>
+              <a:t>// </a:t>
+            </a:r>
+            <a:r>
+              <a:rPr lang="ko-KR" altLang="en-US" sz="1100" dirty="0"/>
+              <a:t>효과 발동 함수</a:t>
+            </a:r>
+            <a:endParaRPr lang="en-US" altLang="ko-KR" sz="1100" dirty="0"/>
+          </a:p>
+          <a:p>
+            <a:r>
+              <a:rPr lang="en-US" altLang="ko-KR" sz="1100" dirty="0"/>
+              <a:t>switch(</a:t>
+            </a:r>
+            <a:r>
+              <a:rPr lang="en-US" altLang="ko-KR" sz="1100" dirty="0" err="1"/>
+              <a:t>effect_id.type</a:t>
+            </a:r>
+            <a:r>
+              <a:rPr lang="en-US" altLang="ko-KR" sz="1100" dirty="0"/>
+              <a:t>)</a:t>
+            </a:r>
+          </a:p>
+          <a:p>
+            <a:r>
+              <a:rPr lang="en-US" altLang="ko-KR" sz="1100" dirty="0"/>
+              <a:t>{</a:t>
+            </a:r>
+          </a:p>
+          <a:p>
+            <a:r>
+              <a:rPr lang="en-US" altLang="ko-KR" sz="1100" dirty="0"/>
+              <a:t>   case 0 : // </a:t>
+            </a:r>
+            <a:r>
+              <a:rPr lang="ko-KR" altLang="en-US" sz="1100" dirty="0"/>
+              <a:t>피해형</a:t>
+            </a:r>
+            <a:endParaRPr lang="en-US" altLang="ko-KR" sz="1100" dirty="0"/>
+          </a:p>
+          <a:p>
+            <a:r>
+              <a:rPr lang="en-US" altLang="ko-KR" sz="1100" dirty="0"/>
+              <a:t>      </a:t>
+            </a:r>
+            <a:r>
+              <a:rPr lang="en-US" altLang="ko-KR" sz="1100" dirty="0" err="1"/>
+              <a:t>DamageDealing</a:t>
+            </a:r>
+            <a:r>
+              <a:rPr lang="en-US" altLang="ko-KR" sz="1100" dirty="0"/>
+              <a:t>(</a:t>
+            </a:r>
+            <a:r>
+              <a:rPr lang="en-US" altLang="ko-KR" sz="1100" dirty="0" err="1"/>
+              <a:t>effect_id.param_key</a:t>
+            </a:r>
+            <a:r>
+              <a:rPr lang="en-US" altLang="ko-KR" sz="1100" dirty="0"/>
+              <a:t>[</a:t>
+            </a:r>
+            <a:r>
+              <a:rPr lang="en-US" altLang="ko-KR" sz="1100" dirty="0" err="1"/>
+              <a:t>base_dmg</a:t>
+            </a:r>
+            <a:r>
+              <a:rPr lang="en-US" altLang="ko-KR" sz="1100" dirty="0"/>
+              <a:t>], </a:t>
+            </a:r>
+            <a:r>
+              <a:rPr lang="en-US" altLang="ko-KR" sz="1100" dirty="0" err="1"/>
+              <a:t>hit_cnt</a:t>
+            </a:r>
+            <a:r>
+              <a:rPr lang="en-US" altLang="ko-KR" sz="1100" dirty="0"/>
+              <a:t>, </a:t>
+            </a:r>
+            <a:r>
+              <a:rPr lang="en-US" altLang="ko-KR" sz="1100" dirty="0" err="1"/>
+              <a:t>hit_interval</a:t>
+            </a:r>
+            <a:r>
+              <a:rPr lang="en-US" altLang="ko-KR" sz="1100" dirty="0"/>
+              <a:t>, stagger, </a:t>
+            </a:r>
+            <a:r>
+              <a:rPr lang="en-US" altLang="ko-KR" sz="1100" dirty="0" err="1"/>
+              <a:t>weak_point</a:t>
+            </a:r>
+            <a:r>
+              <a:rPr lang="en-US" altLang="ko-KR" sz="1100" dirty="0"/>
+              <a:t>}</a:t>
+            </a:r>
+          </a:p>
+          <a:p>
+            <a:r>
+              <a:rPr lang="en-US" altLang="ko-KR" sz="1100" dirty="0"/>
+              <a:t>   case 1 : // </a:t>
+            </a:r>
+            <a:r>
+              <a:rPr lang="ko-KR" altLang="en-US" sz="1100" dirty="0"/>
+              <a:t>능력치 버프</a:t>
+            </a:r>
+            <a:endParaRPr lang="en-US" altLang="ko-KR" sz="1100" dirty="0"/>
+          </a:p>
+          <a:p>
+            <a:r>
+              <a:rPr lang="en-US" altLang="ko-KR" sz="1100" dirty="0"/>
+              <a:t>      Ability(BUFF, </a:t>
+            </a:r>
+            <a:r>
+              <a:rPr lang="en-US" altLang="ko-KR" sz="1100" dirty="0" err="1"/>
+              <a:t>effect_id.sub_type</a:t>
+            </a:r>
+            <a:r>
+              <a:rPr lang="en-US" altLang="ko-KR" sz="1100" dirty="0"/>
+              <a:t>, </a:t>
+            </a:r>
+          </a:p>
+          <a:p>
+            <a:r>
+              <a:rPr lang="en-US" altLang="ko-KR" sz="1100" dirty="0"/>
+              <a:t>   </a:t>
+            </a:r>
+          </a:p>
+          <a:p>
+            <a:r>
+              <a:rPr lang="en-US" altLang="ko-KR" sz="1100" dirty="0"/>
+              <a:t>}</a:t>
+            </a:r>
+          </a:p>
+        </p:txBody>
+      </p:sp>
+      <p:sp>
+        <p:nvSpPr>
+          <p:cNvPr id="9" name="TextBox 8">
+            <a:extLst>
+              <a:ext uri="{FF2B5EF4-FFF2-40B4-BE49-F238E27FC236}">
+                <a16:creationId xmlns:a16="http://schemas.microsoft.com/office/drawing/2014/main" id="{7878F953-3C55-23BC-A323-1F9AF2779330}"/>
+              </a:ext>
+            </a:extLst>
+          </p:cNvPr>
+          <p:cNvSpPr txBox="1"/>
+          <p:nvPr/>
+        </p:nvSpPr>
+        <p:spPr>
+          <a:xfrm>
+            <a:off x="10899659" y="4611667"/>
+            <a:ext cx="1292341" cy="430887"/>
+          </a:xfrm>
+          <a:prstGeom prst="rect">
+            <a:avLst/>
+          </a:prstGeom>
+          <a:noFill/>
+        </p:spPr>
+        <p:txBody>
+          <a:bodyPr wrap="none" rtlCol="0">
+            <a:spAutoFit/>
+          </a:bodyPr>
+          <a:lstStyle/>
+          <a:p>
+            <a:r>
+              <a:rPr lang="en-US" altLang="ko-KR" sz="1100" dirty="0"/>
+              <a:t>// </a:t>
+            </a:r>
+            <a:r>
+              <a:rPr lang="ko-KR" altLang="en-US" sz="1100" dirty="0"/>
+              <a:t>스킬 사용 함수</a:t>
+            </a:r>
+            <a:endParaRPr lang="en-US" altLang="ko-KR" sz="1100" dirty="0"/>
+          </a:p>
+          <a:p>
+            <a:endParaRPr lang="en-US" altLang="ko-KR" sz="1100" dirty="0"/>
+          </a:p>
+        </p:txBody>
+      </p:sp>
+    </p:spTree>
+    <p:extLst>
+      <p:ext uri="{BB962C8B-B14F-4D97-AF65-F5344CB8AC3E}">
+        <p14:creationId xmlns:p14="http://schemas.microsoft.com/office/powerpoint/2010/main" val="4119406946"/>
       </p:ext>
     </p:extLst>
   </p:cSld>

</xml_diff>